<commit_message>
updates to notebook and powerpoint
</commit_message>
<xml_diff>
--- a/Presentation.pptx
+++ b/Presentation.pptx
@@ -383,7 +383,7 @@
             <c:numRef>
               <c:f>Sheet1!$C$2:$C$5</c:f>
               <c:numCache>
-                <c:formatCode>_(* #,##0.0_);_(* \(#,##0.0\);_(* "-"??_);_(@_)</c:formatCode>
+                <c:formatCode>General</c:formatCode>
                 <c:ptCount val="4"/>
               </c:numCache>
             </c:numRef>
@@ -495,7 +495,7 @@
             <c:numRef>
               <c:f>Sheet1!$D$2:$D$5</c:f>
               <c:numCache>
-                <c:formatCode>_(* #,##0.0_);_(* \(#,##0.0\);_(* "-"??_);_(@_)</c:formatCode>
+                <c:formatCode>General</c:formatCode>
                 <c:ptCount val="4"/>
               </c:numCache>
             </c:numRef>
@@ -1398,7 +1398,7 @@
           <a:p>
             <a:fld id="{3F00BCFC-AFFD-334C-A183-6116BAFDF92B}" type="datetimeFigureOut">
               <a:rPr lang="en-US" smtClean="0"/>
-              <a:t>2/28/2023</a:t>
+              <a:t>3/1/2023</a:t>
             </a:fld>
             <a:endParaRPr lang="en-US" dirty="0"/>
           </a:p>
@@ -19054,8 +19054,8 @@
         </p:nvSpPr>
         <p:spPr>
           <a:xfrm>
-            <a:off x="2560320" y="3803904"/>
-            <a:ext cx="7068312" cy="2231136"/>
+            <a:off x="2560320" y="3803903"/>
+            <a:ext cx="7068312" cy="2649147"/>
           </a:xfrm>
         </p:spPr>
         <p:txBody>
@@ -19068,7 +19068,7 @@
             </a:pPr>
             <a:r>
               <a:rPr lang="en-US" dirty="0"/>
-              <a:t>Dataset contains several features: home price thru to renovation year</a:t>
+              <a:t>Dataset contains over 30,000 entries distributed over 25 fields</a:t>
             </a:r>
           </a:p>
           <a:p>
@@ -19076,7 +19076,10 @@
               <a:buFont typeface="Arial" panose="020B0604020202020204" pitchFamily="34" charset="0"/>
               <a:buChar char="•"/>
             </a:pPr>
-            <a:endParaRPr lang="en-US" dirty="0"/>
+            <a:r>
+              <a:rPr lang="en-US" dirty="0"/>
+              <a:t>Some housing features include: Price, Waterfront Status, Patio Square footage, Renovation Year, etc. </a:t>
+            </a:r>
           </a:p>
           <a:p>
             <a:pPr marL="342900" indent="-342900" algn="l">
@@ -21278,6 +21281,15 @@
               <a:t>Focus: Larger square footage</a:t>
             </a:r>
           </a:p>
+          <a:p>
+            <a:endParaRPr lang="en-US" dirty="0"/>
+          </a:p>
+          <a:p>
+            <a:r>
+              <a:rPr lang="en-US" dirty="0"/>
+              <a:t>Increase of 1 = increase of $510 in price</a:t>
+            </a:r>
+          </a:p>
         </p:txBody>
       </p:sp>
       <p:sp>
@@ -21570,6 +21582,15 @@
             <a:r>
               <a:rPr lang="en-US" dirty="0"/>
               <a:t>Focus: Larger (newer) years</a:t>
+            </a:r>
+          </a:p>
+          <a:p>
+            <a:endParaRPr lang="en-US" dirty="0"/>
+          </a:p>
+          <a:p>
+            <a:r>
+              <a:rPr lang="en-US" dirty="0"/>
+              <a:t>Increase of 1 = decrease of $1,588 in price</a:t>
             </a:r>
           </a:p>
           <a:p>
@@ -22878,6 +22899,26 @@
 </file>
 
 <file path=customXml/item1.xml><?xml version="1.0" encoding="utf-8"?>
+<p:properties xmlns:p="http://schemas.microsoft.com/office/2006/metadata/properties" xmlns:xsi="http://www.w3.org/2001/XMLSchema-instance" xmlns:pc="http://schemas.microsoft.com/office/infopath/2007/PartnerControls">
+  <documentManagement>
+    <_ip_UnifiedCompliancePolicyUIAction xmlns="http://schemas.microsoft.com/sharepoint/v3" xsi:nil="true"/>
+    <Image xmlns="71af3243-3dd4-4a8d-8c0d-dd76da1f02a5">
+      <Url xsi:nil="true"/>
+      <Description xsi:nil="true"/>
+    </Image>
+    <Status xmlns="71af3243-3dd4-4a8d-8c0d-dd76da1f02a5">Not started</Status>
+    <Background xmlns="71af3243-3dd4-4a8d-8c0d-dd76da1f02a5">false</Background>
+    <_ip_UnifiedCompliancePolicyProperties xmlns="http://schemas.microsoft.com/sharepoint/v3" xsi:nil="true"/>
+    <ImageTagsTaxHTField xmlns="71af3243-3dd4-4a8d-8c0d-dd76da1f02a5">
+      <Terms xmlns="http://schemas.microsoft.com/office/infopath/2007/PartnerControls"/>
+    </ImageTagsTaxHTField>
+    <TaxCatchAll xmlns="230e9df3-be65-4c73-a93b-d1236ebd677e" xsi:nil="true"/>
+    <MediaServiceKeyPoints xmlns="71af3243-3dd4-4a8d-8c0d-dd76da1f02a5" xsi:nil="true"/>
+  </documentManagement>
+</p:properties>
+</file>
+
+<file path=customXml/item2.xml><?xml version="1.0" encoding="utf-8"?>
 <ct:contentTypeSchema xmlns:ct="http://schemas.microsoft.com/office/2006/metadata/contentType" xmlns:ma="http://schemas.microsoft.com/office/2006/metadata/properties/metaAttributes" ct:_="" ma:_="" ma:contentTypeName="Document" ma:contentTypeID="0x01010079F111ED35F8CC479449609E8A0923A6" ma:contentTypeVersion="25" ma:contentTypeDescription="Create a new document." ma:contentTypeScope="" ma:versionID="e02306daf00165b375dc6a58966960be">
   <xsd:schema xmlns:xsd="http://www.w3.org/2001/XMLSchema" xmlns:xs="http://www.w3.org/2001/XMLSchema" xmlns:p="http://schemas.microsoft.com/office/2006/metadata/properties" xmlns:ns1="http://schemas.microsoft.com/sharepoint/v3" xmlns:ns2="71af3243-3dd4-4a8d-8c0d-dd76da1f02a5" xmlns:ns3="16c05727-aa75-4e4a-9b5f-8a80a1165891" xmlns:ns4="230e9df3-be65-4c73-a93b-d1236ebd677e" targetNamespace="http://schemas.microsoft.com/office/2006/metadata/properties" ma:root="true" ma:fieldsID="df88fb76bf5f555224557953949c1ec9" ns1:_="" ns2:_="" ns3:_="" ns4:_="">
     <xsd:import namespace="http://schemas.microsoft.com/sharepoint/v3"/>
@@ -23171,26 +23212,6 @@
 </ct:contentTypeSchema>
 </file>
 
-<file path=customXml/item2.xml><?xml version="1.0" encoding="utf-8"?>
-<p:properties xmlns:p="http://schemas.microsoft.com/office/2006/metadata/properties" xmlns:xsi="http://www.w3.org/2001/XMLSchema-instance" xmlns:pc="http://schemas.microsoft.com/office/infopath/2007/PartnerControls">
-  <documentManagement>
-    <_ip_UnifiedCompliancePolicyUIAction xmlns="http://schemas.microsoft.com/sharepoint/v3" xsi:nil="true"/>
-    <Image xmlns="71af3243-3dd4-4a8d-8c0d-dd76da1f02a5">
-      <Url xsi:nil="true"/>
-      <Description xsi:nil="true"/>
-    </Image>
-    <Status xmlns="71af3243-3dd4-4a8d-8c0d-dd76da1f02a5">Not started</Status>
-    <Background xmlns="71af3243-3dd4-4a8d-8c0d-dd76da1f02a5">false</Background>
-    <_ip_UnifiedCompliancePolicyProperties xmlns="http://schemas.microsoft.com/sharepoint/v3" xsi:nil="true"/>
-    <ImageTagsTaxHTField xmlns="71af3243-3dd4-4a8d-8c0d-dd76da1f02a5">
-      <Terms xmlns="http://schemas.microsoft.com/office/infopath/2007/PartnerControls"/>
-    </ImageTagsTaxHTField>
-    <TaxCatchAll xmlns="230e9df3-be65-4c73-a93b-d1236ebd677e" xsi:nil="true"/>
-    <MediaServiceKeyPoints xmlns="71af3243-3dd4-4a8d-8c0d-dd76da1f02a5" xsi:nil="true"/>
-  </documentManagement>
-</p:properties>
-</file>
-
 <file path=customXml/item3.xml><?xml version="1.0" encoding="utf-8"?>
 <?mso-contentType ?>
 <FormTemplates xmlns="http://schemas.microsoft.com/sharepoint/v3/contenttype/forms">
@@ -23201,6 +23222,18 @@
 </file>
 
 <file path=customXml/itemProps1.xml><?xml version="1.0" encoding="utf-8"?>
+<ds:datastoreItem xmlns:ds="http://schemas.openxmlformats.org/officeDocument/2006/customXml" ds:itemID="{F8B8ECF1-2A9D-464C-AFE8-2B3295D0BF97}">
+  <ds:schemaRefs>
+    <ds:schemaRef ds:uri="http://schemas.microsoft.com/office/2006/metadata/properties"/>
+    <ds:schemaRef ds:uri="http://schemas.microsoft.com/office/infopath/2007/PartnerControls"/>
+    <ds:schemaRef ds:uri="http://schemas.microsoft.com/sharepoint/v3"/>
+    <ds:schemaRef ds:uri="71af3243-3dd4-4a8d-8c0d-dd76da1f02a5"/>
+    <ds:schemaRef ds:uri="230e9df3-be65-4c73-a93b-d1236ebd677e"/>
+  </ds:schemaRefs>
+</ds:datastoreItem>
+</file>
+
+<file path=customXml/itemProps2.xml><?xml version="1.0" encoding="utf-8"?>
 <ds:datastoreItem xmlns:ds="http://schemas.openxmlformats.org/officeDocument/2006/customXml" ds:itemID="{176493A3-2B83-4E58-86AD-56A2F2A20F12}">
   <ds:schemaRefs>
     <ds:schemaRef ds:uri="http://schemas.microsoft.com/office/2006/metadata/contentType"/>
@@ -23221,18 +23254,6 @@
 </ds:datastoreItem>
 </file>
 
-<file path=customXml/itemProps2.xml><?xml version="1.0" encoding="utf-8"?>
-<ds:datastoreItem xmlns:ds="http://schemas.openxmlformats.org/officeDocument/2006/customXml" ds:itemID="{F8B8ECF1-2A9D-464C-AFE8-2B3295D0BF97}">
-  <ds:schemaRefs>
-    <ds:schemaRef ds:uri="http://schemas.microsoft.com/office/2006/metadata/properties"/>
-    <ds:schemaRef ds:uri="http://schemas.microsoft.com/office/infopath/2007/PartnerControls"/>
-    <ds:schemaRef ds:uri="http://schemas.microsoft.com/sharepoint/v3"/>
-    <ds:schemaRef ds:uri="71af3243-3dd4-4a8d-8c0d-dd76da1f02a5"/>
-    <ds:schemaRef ds:uri="230e9df3-be65-4c73-a93b-d1236ebd677e"/>
-  </ds:schemaRefs>
-</ds:datastoreItem>
-</file>
-
 <file path=customXml/itemProps3.xml><?xml version="1.0" encoding="utf-8"?>
 <ds:datastoreItem xmlns:ds="http://schemas.openxmlformats.org/officeDocument/2006/customXml" ds:itemID="{4F1F1912-3146-44AF-A389-9E8B77BB3688}">
   <ds:schemaRefs>

</xml_diff>